<commit_message>
i am done with changes
</commit_message>
<xml_diff>
--- a/New Microsoft PowerPoint Presentation.pptx
+++ b/New Microsoft PowerPoint Presentation.pptx
@@ -104,6 +104,11 @@
       </a:defRPr>
     </a:lvl9pPr>
   </p:defaultTextStyle>
+  <p:extLst>
+    <p:ext uri="{EFAFB233-063F-42B5-8137-9DF3F51BA10A}">
+      <p15:sldGuideLst xmlns:p15="http://schemas.microsoft.com/office/powerpoint/2012/main"/>
+    </p:ext>
+  </p:extLst>
 </p:presentation>
 </file>
 
@@ -3369,11 +3374,11 @@
           <a:p>
             <a:r>
               <a:rPr lang="en-US" dirty="0"/>
-              <a:t>I want to </a:t>
-            </a:r>
-            <a:r>
-              <a:rPr lang="en-US"/>
-              <a:t>walk with god</a:t>
+              <a:t>I want to walk with god and want to spend </a:t>
+            </a:r>
+            <a:r>
+              <a:rPr lang="en-US"/>
+              <a:t>time with him</a:t>
             </a:r>
           </a:p>
         </p:txBody>

</xml_diff>